<commit_message>
Modified PowerPoint, created READMEs and a gitignore
</commit_message>
<xml_diff>
--- a/Documentation/BCCC Presentation.pptx
+++ b/Documentation/BCCC Presentation.pptx
@@ -6,18 +6,18 @@
   </p:sldMasterIdLst>
   <p:sldIdLst>
     <p:sldId id="256" r:id="rId2"/>
-    <p:sldId id="257" r:id="rId3"/>
-    <p:sldId id="262" r:id="rId4"/>
-    <p:sldId id="265" r:id="rId5"/>
-    <p:sldId id="266" r:id="rId6"/>
-    <p:sldId id="261" r:id="rId7"/>
-    <p:sldId id="259" r:id="rId8"/>
-    <p:sldId id="258" r:id="rId9"/>
-    <p:sldId id="260" r:id="rId10"/>
+    <p:sldId id="262" r:id="rId3"/>
+    <p:sldId id="265" r:id="rId4"/>
+    <p:sldId id="266" r:id="rId5"/>
+    <p:sldId id="261" r:id="rId6"/>
+    <p:sldId id="259" r:id="rId7"/>
+    <p:sldId id="258" r:id="rId8"/>
+    <p:sldId id="260" r:id="rId9"/>
+    <p:sldId id="271" r:id="rId10"/>
     <p:sldId id="267" r:id="rId11"/>
     <p:sldId id="268" r:id="rId12"/>
-    <p:sldId id="263" r:id="rId13"/>
-    <p:sldId id="264" r:id="rId14"/>
+    <p:sldId id="269" r:id="rId13"/>
+    <p:sldId id="270" r:id="rId14"/>
   </p:sldIdLst>
   <p:sldSz cx="12192000" cy="6858000"/>
   <p:notesSz cx="6858000" cy="9144000"/>
@@ -750,7 +750,7 @@
           <a:p>
             <a:fld id="{0CC68602-3462-4157-88AD-C2D7E5EB45C1}" type="datetimeFigureOut">
               <a:rPr lang="en-US" smtClean="0"/>
-              <a:t>11/25/2020</a:t>
+              <a:t>11/29/2020</a:t>
             </a:fld>
             <a:endParaRPr lang="en-US"/>
           </a:p>
@@ -958,7 +958,7 @@
           <a:p>
             <a:fld id="{0CC68602-3462-4157-88AD-C2D7E5EB45C1}" type="datetimeFigureOut">
               <a:rPr lang="en-US" smtClean="0"/>
-              <a:t>11/25/2020</a:t>
+              <a:t>11/29/2020</a:t>
             </a:fld>
             <a:endParaRPr lang="en-US"/>
           </a:p>
@@ -1214,7 +1214,7 @@
           <a:p>
             <a:fld id="{0CC68602-3462-4157-88AD-C2D7E5EB45C1}" type="datetimeFigureOut">
               <a:rPr lang="en-US" smtClean="0"/>
-              <a:t>11/25/2020</a:t>
+              <a:t>11/29/2020</a:t>
             </a:fld>
             <a:endParaRPr lang="en-US"/>
           </a:p>
@@ -1388,7 +1388,7 @@
           <a:p>
             <a:fld id="{0CC68602-3462-4157-88AD-C2D7E5EB45C1}" type="datetimeFigureOut">
               <a:rPr lang="en-US" smtClean="0"/>
-              <a:t>11/25/2020</a:t>
+              <a:t>11/29/2020</a:t>
             </a:fld>
             <a:endParaRPr lang="en-US"/>
           </a:p>
@@ -1731,7 +1731,7 @@
           <a:p>
             <a:fld id="{0CC68602-3462-4157-88AD-C2D7E5EB45C1}" type="datetimeFigureOut">
               <a:rPr lang="en-US" smtClean="0"/>
-              <a:t>11/25/2020</a:t>
+              <a:t>11/29/2020</a:t>
             </a:fld>
             <a:endParaRPr lang="en-US"/>
           </a:p>
@@ -2006,7 +2006,7 @@
           <a:p>
             <a:fld id="{0CC68602-3462-4157-88AD-C2D7E5EB45C1}" type="datetimeFigureOut">
               <a:rPr lang="en-US" smtClean="0"/>
-              <a:t>11/25/2020</a:t>
+              <a:t>11/29/2020</a:t>
             </a:fld>
             <a:endParaRPr lang="en-US"/>
           </a:p>
@@ -2385,7 +2385,7 @@
           <a:p>
             <a:fld id="{0CC68602-3462-4157-88AD-C2D7E5EB45C1}" type="datetimeFigureOut">
               <a:rPr lang="en-US" smtClean="0"/>
-              <a:t>11/25/2020</a:t>
+              <a:t>11/29/2020</a:t>
             </a:fld>
             <a:endParaRPr lang="en-US"/>
           </a:p>
@@ -2503,7 +2503,7 @@
           <a:p>
             <a:fld id="{0CC68602-3462-4157-88AD-C2D7E5EB45C1}" type="datetimeFigureOut">
               <a:rPr lang="en-US" smtClean="0"/>
-              <a:t>11/25/2020</a:t>
+              <a:t>11/29/2020</a:t>
             </a:fld>
             <a:endParaRPr lang="en-US"/>
           </a:p>
@@ -2674,7 +2674,7 @@
           <a:p>
             <a:fld id="{0CC68602-3462-4157-88AD-C2D7E5EB45C1}" type="datetimeFigureOut">
               <a:rPr lang="en-US" smtClean="0"/>
-              <a:t>11/25/2020</a:t>
+              <a:t>11/29/2020</a:t>
             </a:fld>
             <a:endParaRPr lang="en-US"/>
           </a:p>
@@ -3028,7 +3028,7 @@
           <a:p>
             <a:fld id="{0CC68602-3462-4157-88AD-C2D7E5EB45C1}" type="datetimeFigureOut">
               <a:rPr lang="en-US" smtClean="0"/>
-              <a:t>11/25/2020</a:t>
+              <a:t>11/29/2020</a:t>
             </a:fld>
             <a:endParaRPr lang="en-US"/>
           </a:p>
@@ -3410,7 +3410,7 @@
           <a:p>
             <a:fld id="{0CC68602-3462-4157-88AD-C2D7E5EB45C1}" type="datetimeFigureOut">
               <a:rPr lang="en-US" smtClean="0"/>
-              <a:t>11/25/2020</a:t>
+              <a:t>11/29/2020</a:t>
             </a:fld>
             <a:endParaRPr lang="en-US"/>
           </a:p>
@@ -3697,7 +3697,7 @@
           <a:p>
             <a:fld id="{0CC68602-3462-4157-88AD-C2D7E5EB45C1}" type="datetimeFigureOut">
               <a:rPr lang="en-US" smtClean="0"/>
-              <a:t>11/25/2020</a:t>
+              <a:t>11/29/2020</a:t>
             </a:fld>
             <a:endParaRPr lang="en-US"/>
           </a:p>
@@ -4258,7 +4258,37 @@
                   </a:schemeClr>
                 </a:solidFill>
               </a:rPr>
-              <a:t>DATABASE CMS FOR BALTIMORE CITY COMMUNITY COLLEGE</a:t>
+              <a:t>DATABASE </a:t>
+            </a:r>
+            <a:r>
+              <a:rPr lang="en-US" sz="4800" b="1" dirty="0" smtClean="0">
+                <a:solidFill>
+                  <a:schemeClr val="accent2">
+                    <a:lumMod val="75000"/>
+                  </a:schemeClr>
+                </a:solidFill>
+              </a:rPr>
+              <a:t>INTERACTIONS</a:t>
+            </a:r>
+            <a:r>
+              <a:rPr lang="en-US" sz="4800" b="1" dirty="0" smtClean="0">
+                <a:solidFill>
+                  <a:schemeClr val="accent2">
+                    <a:lumMod val="75000"/>
+                  </a:schemeClr>
+                </a:solidFill>
+              </a:rPr>
+              <a:t> FOR </a:t>
+            </a:r>
+            <a:r>
+              <a:rPr lang="en-US" sz="4800" b="1" dirty="0">
+                <a:solidFill>
+                  <a:schemeClr val="accent2">
+                    <a:lumMod val="75000"/>
+                  </a:schemeClr>
+                </a:solidFill>
+              </a:rPr>
+              <a:t>BALTIMORE CITY COMMUNITY COLLEGE</a:t>
             </a:r>
           </a:p>
         </p:txBody>
@@ -4284,6 +4314,17 @@
           <a:bodyPr/>
           <a:lstStyle/>
           <a:p>
+            <a:pPr algn="r"/>
+            <a:r>
+              <a:rPr lang="en-US" b="1" dirty="0">
+                <a:solidFill>
+                  <a:schemeClr val="accent2">
+                    <a:lumMod val="75000"/>
+                  </a:schemeClr>
+                </a:solidFill>
+              </a:rPr>
+              <a:t>CHRISTIAN SAULS, MATT CLARK, JACOB DELLA, DALTON BROWN</a:t>
+            </a:r>
             <a:endParaRPr lang="en-US" dirty="0"/>
           </a:p>
         </p:txBody>
@@ -4410,8 +4451,13 @@
             </a:pPr>
             <a:r>
               <a:rPr lang="en-US" dirty="0"/>
-              <a:t>Application is designed to be very simple to use.</a:t>
-            </a:r>
+              <a:t>Application is designed to be very simple to </a:t>
+            </a:r>
+            <a:r>
+              <a:rPr lang="en-US" dirty="0" smtClean="0"/>
+              <a:t>use</a:t>
+            </a:r>
+            <a:endParaRPr lang="en-US" dirty="0"/>
           </a:p>
           <a:p>
             <a:pPr>
@@ -4420,8 +4466,29 @@
             </a:pPr>
             <a:r>
               <a:rPr lang="en-US" dirty="0"/>
-              <a:t>Simply click a query on the query list, click execute and a window will pop up prompting the user for the parameters of that report.</a:t>
-            </a:r>
+              <a:t>Simply click a query </a:t>
+            </a:r>
+            <a:r>
+              <a:rPr lang="en-US" dirty="0" smtClean="0"/>
+              <a:t>in </a:t>
+            </a:r>
+            <a:r>
+              <a:rPr lang="en-US" dirty="0"/>
+              <a:t>the query list, click </a:t>
+            </a:r>
+            <a:r>
+              <a:rPr lang="en-US" dirty="0" smtClean="0"/>
+              <a:t>the execute button, </a:t>
+            </a:r>
+            <a:r>
+              <a:rPr lang="en-US" dirty="0"/>
+              <a:t>and a window will pop up prompting the user for the parameters </a:t>
+            </a:r>
+            <a:r>
+              <a:rPr lang="en-US" dirty="0" smtClean="0"/>
+              <a:t>required for that query</a:t>
+            </a:r>
+            <a:endParaRPr lang="en-US" dirty="0"/>
           </a:p>
           <a:p>
             <a:pPr>
@@ -4430,8 +4497,39 @@
             </a:pPr>
             <a:r>
               <a:rPr lang="en-US" dirty="0"/>
-              <a:t>After parameters are entered hitting submit will execute the query.</a:t>
-            </a:r>
+              <a:t>After parameters are </a:t>
+            </a:r>
+            <a:r>
+              <a:rPr lang="en-US" dirty="0" smtClean="0"/>
+              <a:t>entered, </a:t>
+            </a:r>
+            <a:r>
+              <a:rPr lang="en-US" dirty="0"/>
+              <a:t>hitting </a:t>
+            </a:r>
+            <a:r>
+              <a:rPr lang="en-US" dirty="0" smtClean="0"/>
+              <a:t>“Submit” </a:t>
+            </a:r>
+            <a:r>
+              <a:rPr lang="en-US" dirty="0"/>
+              <a:t>will execute the </a:t>
+            </a:r>
+            <a:r>
+              <a:rPr lang="en-US" dirty="0" smtClean="0"/>
+              <a:t>query</a:t>
+            </a:r>
+          </a:p>
+          <a:p>
+            <a:pPr lvl="1">
+              <a:buFont typeface="Arial" panose="020B0604020202020204" pitchFamily="34" charset="0"/>
+              <a:buChar char="•"/>
+            </a:pPr>
+            <a:r>
+              <a:rPr lang="en-US" dirty="0" smtClean="0"/>
+              <a:t>Results neatly placed into the table</a:t>
+            </a:r>
+            <a:endParaRPr lang="en-US" dirty="0"/>
           </a:p>
           <a:p>
             <a:pPr>
@@ -4464,12 +4562,22 @@
         </p:blipFill>
         <p:spPr>
           <a:xfrm>
-            <a:off x="1097280" y="3429000"/>
-            <a:ext cx="4564380" cy="1791562"/>
+            <a:off x="559761" y="3894484"/>
+            <a:ext cx="5437623" cy="2134318"/>
           </a:xfrm>
           <a:prstGeom prst="rect">
             <a:avLst/>
           </a:prstGeom>
+          <a:ln>
+            <a:noFill/>
+          </a:ln>
+          <a:effectLst>
+            <a:outerShdw blurRad="190500" algn="tl" rotWithShape="0">
+              <a:srgbClr val="000000">
+                <a:alpha val="70000"/>
+              </a:srgbClr>
+            </a:outerShdw>
+          </a:effectLst>
         </p:spPr>
       </p:pic>
       <p:pic>
@@ -4494,12 +4602,22 @@
         </p:blipFill>
         <p:spPr>
           <a:xfrm>
-            <a:off x="7010400" y="3398216"/>
-            <a:ext cx="4648200" cy="1822345"/>
+            <a:off x="6250046" y="3895723"/>
+            <a:ext cx="5437623" cy="2131841"/>
           </a:xfrm>
           <a:prstGeom prst="rect">
             <a:avLst/>
           </a:prstGeom>
+          <a:ln>
+            <a:noFill/>
+          </a:ln>
+          <a:effectLst>
+            <a:outerShdw blurRad="190500" algn="tl" rotWithShape="0">
+              <a:srgbClr val="000000">
+                <a:alpha val="70000"/>
+              </a:srgbClr>
+            </a:outerShdw>
+          </a:effectLst>
         </p:spPr>
       </p:pic>
     </p:spTree>
@@ -4583,9 +4701,16 @@
             <p:ph idx="1"/>
           </p:nvPr>
         </p:nvSpPr>
-        <p:spPr/>
-        <p:txBody>
-          <a:bodyPr/>
+        <p:spPr>
+          <a:xfrm>
+            <a:off x="1097280" y="1845734"/>
+            <a:ext cx="3882493" cy="4023360"/>
+          </a:xfrm>
+        </p:spPr>
+        <p:txBody>
+          <a:bodyPr>
+            <a:normAutofit/>
+          </a:bodyPr>
           <a:lstStyle/>
           <a:p>
             <a:pPr>
@@ -4593,47 +4718,110 @@
               <a:buChar char="•"/>
             </a:pPr>
             <a:r>
-              <a:rPr lang="en-US" dirty="0"/>
-              <a:t>Database password and cursor object is stored inside of the Python script</a:t>
-            </a:r>
-          </a:p>
-          <a:p>
-            <a:pPr>
+              <a:rPr lang="en-US" dirty="0" smtClean="0"/>
+              <a:t>Python 3 script</a:t>
+            </a:r>
+          </a:p>
+          <a:p>
+            <a:pPr lvl="1">
               <a:buFont typeface="Arial" panose="020B0604020202020204" pitchFamily="34" charset="0"/>
               <a:buChar char="•"/>
             </a:pPr>
             <a:r>
-              <a:rPr lang="en-US" dirty="0"/>
-              <a:t>The entire application is a single monolithic Python script</a:t>
-            </a:r>
-          </a:p>
-          <a:p>
-            <a:pPr>
+              <a:rPr lang="en-US" dirty="0" smtClean="0"/>
+              <a:t>Connects to the database</a:t>
+            </a:r>
+          </a:p>
+          <a:p>
+            <a:pPr lvl="1">
               <a:buFont typeface="Arial" panose="020B0604020202020204" pitchFamily="34" charset="0"/>
               <a:buChar char="•"/>
             </a:pPr>
             <a:r>
               <a:rPr lang="en-US" dirty="0"/>
-              <a:t>The current version of the application needs to be launched via the terminal and displays real time debugging output to help fix issues and database problems.</a:t>
-            </a:r>
-          </a:p>
-          <a:p>
-            <a:pPr>
+              <a:t>Outputs debugging information to the console</a:t>
+            </a:r>
+          </a:p>
+          <a:p>
+            <a:pPr lvl="1">
               <a:buFont typeface="Arial" panose="020B0604020202020204" pitchFamily="34" charset="0"/>
               <a:buChar char="•"/>
             </a:pPr>
             <a:r>
-              <a:rPr lang="en-US" dirty="0"/>
-              <a:t>Utilizes many Python language paradigms to make easily </a:t>
-            </a:r>
-            <a:r>
-              <a:rPr lang="en-US"/>
-              <a:t>maintainable code.</a:t>
-            </a:r>
-            <a:endParaRPr lang="en-US" dirty="0"/>
-          </a:p>
-        </p:txBody>
-      </p:sp>
+              <a:rPr lang="en-US" dirty="0" smtClean="0"/>
+              <a:t>Uses the </a:t>
+            </a:r>
+            <a:r>
+              <a:rPr lang="en-US" dirty="0" err="1" smtClean="0"/>
+              <a:t>Tkinter</a:t>
+            </a:r>
+            <a:r>
+              <a:rPr lang="en-US" dirty="0" smtClean="0"/>
+              <a:t> library for our GUI</a:t>
+            </a:r>
+          </a:p>
+          <a:p>
+            <a:pPr lvl="2">
+              <a:buFont typeface="Arial" panose="020B0604020202020204" pitchFamily="34" charset="0"/>
+              <a:buChar char="•"/>
+            </a:pPr>
+            <a:r>
+              <a:rPr lang="en-US" dirty="0" smtClean="0"/>
+              <a:t>Dynamically generates all popup windows and parameters with their entry boxes</a:t>
+            </a:r>
+          </a:p>
+          <a:p>
+            <a:pPr lvl="1">
+              <a:buFont typeface="Arial" panose="020B0604020202020204" pitchFamily="34" charset="0"/>
+              <a:buChar char="•"/>
+            </a:pPr>
+            <a:r>
+              <a:rPr lang="en-US" dirty="0" smtClean="0"/>
+              <a:t>Dynamically executes queries based on the user’s option via a dictionary containing the necessary information for each query</a:t>
+            </a:r>
+          </a:p>
+          <a:p>
+            <a:pPr lvl="2">
+              <a:buFont typeface="Arial" panose="020B0604020202020204" pitchFamily="34" charset="0"/>
+              <a:buChar char="•"/>
+            </a:pPr>
+            <a:r>
+              <a:rPr lang="en-US" dirty="0" smtClean="0"/>
+              <a:t>Extremely extensible and maintainable</a:t>
+            </a:r>
+          </a:p>
+        </p:txBody>
+      </p:sp>
+      <p:pic>
+        <p:nvPicPr>
+          <p:cNvPr id="5" name="Picture 4"/>
+          <p:cNvPicPr>
+            <a:picLocks noChangeAspect="1"/>
+          </p:cNvPicPr>
+          <p:nvPr/>
+        </p:nvPicPr>
+        <p:blipFill>
+          <a:blip r:embed="rId2" cstate="hqprint">
+            <a:extLst>
+              <a:ext uri="{28A0092B-C50C-407E-A947-70E740481C1C}">
+                <a14:useLocalDpi xmlns:a14="http://schemas.microsoft.com/office/drawing/2010/main" val="0"/>
+              </a:ext>
+            </a:extLst>
+          </a:blip>
+          <a:stretch>
+            <a:fillRect/>
+          </a:stretch>
+        </p:blipFill>
+        <p:spPr>
+          <a:xfrm>
+            <a:off x="4979773" y="1625527"/>
+            <a:ext cx="6869533" cy="5232473"/>
+          </a:xfrm>
+          <a:prstGeom prst="rect">
+            <a:avLst/>
+          </a:prstGeom>
+        </p:spPr>
+      </p:pic>
     </p:spTree>
     <p:extLst>
       <p:ext uri="{BB962C8B-B14F-4D97-AF65-F5344CB8AC3E}">
@@ -4666,13 +4854,7 @@
       </p:grpSpPr>
       <p:sp>
         <p:nvSpPr>
-          <p:cNvPr id="2" name="Title 1">
-            <a:extLst>
-              <a:ext uri="{FF2B5EF4-FFF2-40B4-BE49-F238E27FC236}">
-                <a16:creationId xmlns:a16="http://schemas.microsoft.com/office/drawing/2014/main" id="{BB7857C3-F601-4DCB-8CEE-9E7FA3B7605F}"/>
-              </a:ext>
-            </a:extLst>
-          </p:cNvPr>
+          <p:cNvPr id="2" name="Title 1"/>
           <p:cNvSpPr>
             <a:spLocks noGrp="1"/>
           </p:cNvSpPr>
@@ -4680,9 +4862,14 @@
             <p:ph type="title"/>
           </p:nvPr>
         </p:nvSpPr>
-        <p:spPr/>
-        <p:txBody>
-          <a:bodyPr/>
+        <p:spPr>
+          <a:xfrm>
+            <a:off x="1066800" y="2234184"/>
+            <a:ext cx="10058400" cy="2389632"/>
+          </a:xfrm>
+        </p:spPr>
+        <p:txBody>
+          <a:bodyPr anchor="ctr"/>
           <a:lstStyle/>
           <a:p>
             <a:pPr algn="ctr"/>
@@ -4696,30 +4883,6 @@
               </a:rPr>
               <a:t>LIVE DEMO</a:t>
             </a:r>
-          </a:p>
-        </p:txBody>
-      </p:sp>
-      <p:sp>
-        <p:nvSpPr>
-          <p:cNvPr id="3" name="Content Placeholder 2">
-            <a:extLst>
-              <a:ext uri="{FF2B5EF4-FFF2-40B4-BE49-F238E27FC236}">
-                <a16:creationId xmlns:a16="http://schemas.microsoft.com/office/drawing/2014/main" id="{66506E3D-2AD4-495D-A6C3-399135F42EC1}"/>
-              </a:ext>
-            </a:extLst>
-          </p:cNvPr>
-          <p:cNvSpPr>
-            <a:spLocks noGrp="1"/>
-          </p:cNvSpPr>
-          <p:nvPr>
-            <p:ph idx="1"/>
-          </p:nvPr>
-        </p:nvSpPr>
-        <p:spPr/>
-        <p:txBody>
-          <a:bodyPr/>
-          <a:lstStyle/>
-          <a:p>
             <a:endParaRPr lang="en-US" dirty="0"/>
           </a:p>
         </p:txBody>
@@ -4727,7 +4890,7 @@
     </p:spTree>
     <p:extLst>
       <p:ext uri="{BB962C8B-B14F-4D97-AF65-F5344CB8AC3E}">
-        <p14:creationId xmlns:p14="http://schemas.microsoft.com/office/powerpoint/2010/main" val="2973539549"/>
+        <p14:creationId xmlns:p14="http://schemas.microsoft.com/office/powerpoint/2010/main" val="558200755"/>
       </p:ext>
     </p:extLst>
   </p:cSld>
@@ -4756,13 +4919,7 @@
       </p:grpSpPr>
       <p:sp>
         <p:nvSpPr>
-          <p:cNvPr id="2" name="Title 1">
-            <a:extLst>
-              <a:ext uri="{FF2B5EF4-FFF2-40B4-BE49-F238E27FC236}">
-                <a16:creationId xmlns:a16="http://schemas.microsoft.com/office/drawing/2014/main" id="{BB7857C3-F601-4DCB-8CEE-9E7FA3B7605F}"/>
-              </a:ext>
-            </a:extLst>
-          </p:cNvPr>
+          <p:cNvPr id="2" name="Title 1"/>
           <p:cNvSpPr>
             <a:spLocks noGrp="1"/>
           </p:cNvSpPr>
@@ -4770,54 +4927,76 @@
             <p:ph type="title"/>
           </p:nvPr>
         </p:nvSpPr>
-        <p:spPr/>
-        <p:txBody>
-          <a:bodyPr/>
+        <p:spPr>
+          <a:xfrm>
+            <a:off x="1066800" y="2234184"/>
+            <a:ext cx="10058400" cy="2389632"/>
+          </a:xfrm>
+        </p:spPr>
+        <p:txBody>
+          <a:bodyPr anchor="ctr"/>
           <a:lstStyle/>
           <a:p>
             <a:pPr algn="ctr"/>
             <a:r>
-              <a:rPr lang="en-US" b="1" dirty="0">
+              <a:rPr lang="en-US" b="1" dirty="0" smtClean="0">
                 <a:solidFill>
                   <a:schemeClr val="accent1">
                     <a:lumMod val="75000"/>
                   </a:schemeClr>
                 </a:solidFill>
+                <a:effectLst>
+                  <a:outerShdw blurRad="38100" dist="38100" dir="2700000" algn="tl">
+                    <a:srgbClr val="000000">
+                      <a:alpha val="43137"/>
+                    </a:srgbClr>
+                  </a:outerShdw>
+                </a:effectLst>
               </a:rPr>
-              <a:t>THANK YOU FOR YOUR ATTENTION!</a:t>
-            </a:r>
-          </a:p>
-        </p:txBody>
-      </p:sp>
-      <p:sp>
-        <p:nvSpPr>
-          <p:cNvPr id="3" name="Content Placeholder 2">
-            <a:extLst>
-              <a:ext uri="{FF2B5EF4-FFF2-40B4-BE49-F238E27FC236}">
-                <a16:creationId xmlns:a16="http://schemas.microsoft.com/office/drawing/2014/main" id="{66506E3D-2AD4-495D-A6C3-399135F42EC1}"/>
-              </a:ext>
-            </a:extLst>
-          </p:cNvPr>
-          <p:cNvSpPr>
-            <a:spLocks noGrp="1"/>
-          </p:cNvSpPr>
-          <p:nvPr>
-            <p:ph idx="1"/>
-          </p:nvPr>
-        </p:nvSpPr>
-        <p:spPr/>
-        <p:txBody>
-          <a:bodyPr/>
-          <a:lstStyle/>
-          <a:p>
-            <a:endParaRPr lang="en-US" dirty="0"/>
+              <a:t>Thank you</a:t>
+            </a:r>
+            <a:br>
+              <a:rPr lang="en-US" b="1" dirty="0" smtClean="0">
+                <a:solidFill>
+                  <a:schemeClr val="accent1">
+                    <a:lumMod val="75000"/>
+                  </a:schemeClr>
+                </a:solidFill>
+                <a:effectLst>
+                  <a:outerShdw blurRad="38100" dist="38100" dir="2700000" algn="tl">
+                    <a:srgbClr val="000000">
+                      <a:alpha val="43137"/>
+                    </a:srgbClr>
+                  </a:outerShdw>
+                </a:effectLst>
+              </a:rPr>
+            </a:br>
+            <a:r>
+              <a:rPr lang="en-US" sz="4000" b="1" dirty="0" smtClean="0">
+                <a:solidFill>
+                  <a:schemeClr val="accent1">
+                    <a:lumMod val="60000"/>
+                    <a:lumOff val="40000"/>
+                  </a:schemeClr>
+                </a:solidFill>
+              </a:rPr>
+              <a:t>Questions?</a:t>
+            </a:r>
+            <a:endParaRPr lang="en-US" sz="4000" dirty="0">
+              <a:solidFill>
+                <a:schemeClr val="accent1">
+                  <a:lumMod val="60000"/>
+                  <a:lumOff val="40000"/>
+                </a:schemeClr>
+              </a:solidFill>
+            </a:endParaRPr>
           </a:p>
         </p:txBody>
       </p:sp>
     </p:spTree>
     <p:extLst>
       <p:ext uri="{BB962C8B-B14F-4D97-AF65-F5344CB8AC3E}">
-        <p14:creationId xmlns:p14="http://schemas.microsoft.com/office/powerpoint/2010/main" val="1381257591"/>
+        <p14:creationId xmlns:p14="http://schemas.microsoft.com/office/powerpoint/2010/main" val="2512640176"/>
       </p:ext>
     </p:extLst>
   </p:cSld>
@@ -4849,7 +5028,7 @@
           <p:cNvPr id="2" name="Title 1">
             <a:extLst>
               <a:ext uri="{FF2B5EF4-FFF2-40B4-BE49-F238E27FC236}">
-                <a16:creationId xmlns:a16="http://schemas.microsoft.com/office/drawing/2014/main" id="{B4510413-2966-483D-9891-026880CEB3B3}"/>
+                <a16:creationId xmlns:a16="http://schemas.microsoft.com/office/drawing/2014/main" id="{BB7857C3-F601-4DCB-8CEE-9E7FA3B7605F}"/>
               </a:ext>
             </a:extLst>
           </p:cNvPr>
@@ -4857,92 +5036,96 @@
             <a:spLocks noGrp="1"/>
           </p:cNvSpPr>
           <p:nvPr>
-            <p:ph type="ctrTitle"/>
-          </p:nvPr>
-        </p:nvSpPr>
-        <p:spPr>
-          <a:xfrm>
-            <a:off x="1066800" y="559676"/>
-            <a:ext cx="10058400" cy="3566160"/>
-          </a:xfrm>
-        </p:spPr>
+            <p:ph type="title"/>
+          </p:nvPr>
+        </p:nvSpPr>
+        <p:spPr/>
+        <p:txBody>
+          <a:bodyPr/>
+          <a:lstStyle/>
+          <a:p>
+            <a:pPr algn="ctr"/>
+            <a:r>
+              <a:rPr lang="en-US" b="1" dirty="0">
+                <a:solidFill>
+                  <a:schemeClr val="accent1">
+                    <a:lumMod val="75000"/>
+                  </a:schemeClr>
+                </a:solidFill>
+              </a:rPr>
+              <a:t>INTRODUCTION</a:t>
+            </a:r>
+          </a:p>
+        </p:txBody>
+      </p:sp>
+      <p:sp>
+        <p:nvSpPr>
+          <p:cNvPr id="3" name="Content Placeholder 2">
+            <a:extLst>
+              <a:ext uri="{FF2B5EF4-FFF2-40B4-BE49-F238E27FC236}">
+                <a16:creationId xmlns:a16="http://schemas.microsoft.com/office/drawing/2014/main" id="{66506E3D-2AD4-495D-A6C3-399135F42EC1}"/>
+              </a:ext>
+            </a:extLst>
+          </p:cNvPr>
+          <p:cNvSpPr>
+            <a:spLocks noGrp="1"/>
+          </p:cNvSpPr>
+          <p:nvPr>
+            <p:ph idx="1"/>
+          </p:nvPr>
+        </p:nvSpPr>
+        <p:spPr/>
         <p:txBody>
           <a:bodyPr>
             <a:normAutofit/>
           </a:bodyPr>
           <a:lstStyle/>
           <a:p>
-            <a:pPr algn="ctr"/>
-            <a:r>
-              <a:rPr lang="en-US" sz="3200" b="1" dirty="0">
-                <a:solidFill>
-                  <a:schemeClr val="accent2">
-                    <a:lumMod val="75000"/>
-                  </a:schemeClr>
-                </a:solidFill>
-              </a:rPr>
-              <a:t>TEAM MEMBERS</a:t>
-            </a:r>
-            <a:br>
-              <a:rPr lang="en-US" sz="3200" b="1" dirty="0">
-                <a:solidFill>
-                  <a:schemeClr val="accent2">
-                    <a:lumMod val="75000"/>
-                  </a:schemeClr>
-                </a:solidFill>
-              </a:rPr>
-            </a:br>
-            <a:br>
-              <a:rPr lang="en-US" sz="3200" b="1" dirty="0">
-                <a:solidFill>
-                  <a:schemeClr val="accent2">
-                    <a:lumMod val="75000"/>
-                  </a:schemeClr>
-                </a:solidFill>
-              </a:rPr>
-            </a:br>
-            <a:r>
-              <a:rPr lang="en-US" sz="3200" b="1" dirty="0">
-                <a:solidFill>
-                  <a:schemeClr val="accent2">
-                    <a:lumMod val="75000"/>
-                  </a:schemeClr>
-                </a:solidFill>
-              </a:rPr>
-              <a:t>CHRISTIAN SAULS, MATT CLARK, JACOB DELLA, DALTON BROWN</a:t>
-            </a:r>
-          </a:p>
-        </p:txBody>
-      </p:sp>
-      <p:sp>
-        <p:nvSpPr>
-          <p:cNvPr id="3" name="Subtitle 2">
-            <a:extLst>
-              <a:ext uri="{FF2B5EF4-FFF2-40B4-BE49-F238E27FC236}">
-                <a16:creationId xmlns:a16="http://schemas.microsoft.com/office/drawing/2014/main" id="{52B8549D-AD43-4FAE-81E4-A2504A09A7F6}"/>
-              </a:ext>
-            </a:extLst>
-          </p:cNvPr>
-          <p:cNvSpPr>
-            <a:spLocks noGrp="1"/>
-          </p:cNvSpPr>
-          <p:nvPr>
-            <p:ph type="subTitle" idx="1"/>
-          </p:nvPr>
-        </p:nvSpPr>
-        <p:spPr/>
-        <p:txBody>
-          <a:bodyPr/>
-          <a:lstStyle/>
-          <a:p>
-            <a:endParaRPr lang="en-US" dirty="0"/>
+            <a:pPr>
+              <a:buFont typeface="Arial" panose="020B0604020202020204" pitchFamily="34" charset="0"/>
+              <a:buChar char="•"/>
+            </a:pPr>
+            <a:r>
+              <a:rPr lang="en-US" sz="2400" dirty="0"/>
+              <a:t>Baltimore City Community College desires a database and an application to display specific queries and information.</a:t>
+            </a:r>
+          </a:p>
+          <a:p>
+            <a:pPr>
+              <a:buFont typeface="Arial" panose="020B0604020202020204" pitchFamily="34" charset="0"/>
+              <a:buChar char="•"/>
+            </a:pPr>
+            <a:r>
+              <a:rPr lang="en-US" sz="2400" dirty="0"/>
+              <a:t>Their departments heavily rely on paper and manual labor to store information on day-to-day functions and generate reports. This can take days and is far from optimal.</a:t>
+            </a:r>
+          </a:p>
+          <a:p>
+            <a:pPr>
+              <a:buFont typeface="Arial" panose="020B0604020202020204" pitchFamily="34" charset="0"/>
+              <a:buChar char="•"/>
+            </a:pPr>
+            <a:r>
+              <a:rPr lang="en-US" sz="2400" dirty="0"/>
+              <a:t>Due to the departments decentralized management the backlog of searching and finding records on visitors, students and staff becomes extremely laborious.</a:t>
+            </a:r>
+          </a:p>
+          <a:p>
+            <a:pPr>
+              <a:buFont typeface="Arial" panose="020B0604020202020204" pitchFamily="34" charset="0"/>
+              <a:buChar char="•"/>
+            </a:pPr>
+            <a:r>
+              <a:rPr lang="en-US" sz="2400" dirty="0"/>
+              <a:t>We worked together with BCCC to develop and design an ERD, schema and associated application.</a:t>
+            </a:r>
           </a:p>
         </p:txBody>
       </p:sp>
     </p:spTree>
     <p:extLst>
       <p:ext uri="{BB962C8B-B14F-4D97-AF65-F5344CB8AC3E}">
-        <p14:creationId xmlns:p14="http://schemas.microsoft.com/office/powerpoint/2010/main" val="165935028"/>
+        <p14:creationId xmlns:p14="http://schemas.microsoft.com/office/powerpoint/2010/main" val="264883934"/>
       </p:ext>
     </p:extLst>
   </p:cSld>
@@ -4990,7 +5173,6 @@
           <a:bodyPr/>
           <a:lstStyle/>
           <a:p>
-            <a:pPr algn="ctr"/>
             <a:r>
               <a:rPr lang="en-US" b="1" dirty="0">
                 <a:solidFill>
@@ -4999,8 +5181,25 @@
                   </a:schemeClr>
                 </a:solidFill>
               </a:rPr>
-              <a:t>INTRODUCTION</a:t>
-            </a:r>
+              <a:t>USER </a:t>
+            </a:r>
+            <a:r>
+              <a:rPr lang="en-US" b="1" dirty="0" smtClean="0">
+                <a:solidFill>
+                  <a:schemeClr val="accent1">
+                    <a:lumMod val="75000"/>
+                  </a:schemeClr>
+                </a:solidFill>
+              </a:rPr>
+              <a:t>REQUIREMENTS – Expected Queries</a:t>
+            </a:r>
+            <a:endParaRPr lang="en-US" b="1" dirty="0">
+              <a:solidFill>
+                <a:schemeClr val="accent1">
+                  <a:lumMod val="75000"/>
+                </a:schemeClr>
+              </a:solidFill>
+            </a:endParaRPr>
           </a:p>
         </p:txBody>
       </p:sp>
@@ -5023,7 +5222,7 @@
         <p:spPr/>
         <p:txBody>
           <a:bodyPr>
-            <a:normAutofit/>
+            <a:normAutofit fontScale="85000" lnSpcReduction="20000"/>
           </a:bodyPr>
           <a:lstStyle/>
           <a:p>
@@ -5032,8 +5231,12 @@
               <a:buChar char="•"/>
             </a:pPr>
             <a:r>
-              <a:rPr lang="en-US" sz="2400" dirty="0"/>
-              <a:t>Baltimore City Community College desires a database and an application to display specific queries and information.</a:t>
+              <a:rPr lang="en-US" sz="2200" dirty="0" smtClean="0"/>
+              <a:t>List </a:t>
+            </a:r>
+            <a:r>
+              <a:rPr lang="en-US" sz="2200" dirty="0"/>
+              <a:t>the names of the courses offered by a specific program.</a:t>
             </a:r>
           </a:p>
           <a:p>
@@ -5042,8 +5245,8 @@
               <a:buChar char="•"/>
             </a:pPr>
             <a:r>
-              <a:rPr lang="en-US" sz="2400" dirty="0"/>
-              <a:t>Their departments heavily rely on paper and manual labor to store information on day-to-day functions and generate reports. This can take days and is far from optimal.</a:t>
+              <a:rPr lang="en-US" sz="2200" dirty="0"/>
+              <a:t>List what courses are offered in a specific department during a specific semester.</a:t>
             </a:r>
           </a:p>
           <a:p>
@@ -5052,8 +5255,8 @@
               <a:buChar char="•"/>
             </a:pPr>
             <a:r>
-              <a:rPr lang="en-US" sz="2400" dirty="0"/>
-              <a:t>Due to the departments decentralized management the backlog of searching and finding records on visitors, students and staff becomes extremely laborious.</a:t>
+              <a:rPr lang="en-US" sz="2200" dirty="0"/>
+              <a:t>List the first and last names of staff that teach a course in a specific program.</a:t>
             </a:r>
           </a:p>
           <a:p>
@@ -5062,16 +5265,83 @@
               <a:buChar char="•"/>
             </a:pPr>
             <a:r>
-              <a:rPr lang="en-US" sz="2400" dirty="0"/>
-              <a:t>We worked together with BCCC to develop and design an ERD, schema and associated application.</a:t>
-            </a:r>
+              <a:rPr lang="en-US" sz="2200" dirty="0"/>
+              <a:t>List the first and last names of staff that are also an advisor.</a:t>
+            </a:r>
+          </a:p>
+          <a:p>
+            <a:pPr>
+              <a:buFont typeface="Arial" panose="020B0604020202020204" pitchFamily="34" charset="0"/>
+              <a:buChar char="•"/>
+            </a:pPr>
+            <a:r>
+              <a:rPr lang="en-US" sz="2200" dirty="0"/>
+              <a:t>List the first and last names of students who has a specific staff member as an advisor.</a:t>
+            </a:r>
+          </a:p>
+          <a:p>
+            <a:pPr>
+              <a:buFont typeface="Arial" panose="020B0604020202020204" pitchFamily="34" charset="0"/>
+              <a:buChar char="•"/>
+            </a:pPr>
+            <a:r>
+              <a:rPr lang="en-US" sz="2200" dirty="0"/>
+              <a:t>Retrieve how many students withdrew/dropped a specific course during a specific semester.</a:t>
+            </a:r>
+          </a:p>
+          <a:p>
+            <a:pPr>
+              <a:buFont typeface="Arial" panose="020B0604020202020204" pitchFamily="34" charset="0"/>
+              <a:buChar char="•"/>
+            </a:pPr>
+            <a:r>
+              <a:rPr lang="en-US" sz="2200" dirty="0"/>
+              <a:t>Generate a list of professors who have taught at Baltimore City Community College for more than or equal to five years as of a specific semester.</a:t>
+            </a:r>
+          </a:p>
+          <a:p>
+            <a:pPr>
+              <a:buFont typeface="Arial" panose="020B0604020202020204" pitchFamily="34" charset="0"/>
+              <a:buChar char="•"/>
+            </a:pPr>
+            <a:r>
+              <a:rPr lang="en-US" sz="2200" dirty="0"/>
+              <a:t>List all of the first and last names of students enrolled in a specific program who are female.</a:t>
+            </a:r>
+          </a:p>
+          <a:p>
+            <a:pPr>
+              <a:buFont typeface="Arial" panose="020B0604020202020204" pitchFamily="34" charset="0"/>
+              <a:buChar char="•"/>
+            </a:pPr>
+            <a:r>
+              <a:rPr lang="en-US" sz="2200" dirty="0"/>
+              <a:t>Find the name of the student who has a specific ID no.</a:t>
+            </a:r>
+          </a:p>
+          <a:p>
+            <a:pPr>
+              <a:buFont typeface="Arial" panose="020B0604020202020204" pitchFamily="34" charset="0"/>
+              <a:buChar char="•"/>
+            </a:pPr>
+            <a:r>
+              <a:rPr lang="en-US" sz="2200" dirty="0"/>
+              <a:t>List the grade records all of the courses during a specific semester for a particular student. </a:t>
+            </a:r>
+          </a:p>
+          <a:p>
+            <a:pPr lvl="1">
+              <a:buFont typeface="Arial" panose="020B0604020202020204" pitchFamily="34" charset="0"/>
+              <a:buChar char="•"/>
+            </a:pPr>
+            <a:endParaRPr lang="en-US" dirty="0"/>
           </a:p>
         </p:txBody>
       </p:sp>
     </p:spTree>
     <p:extLst>
       <p:ext uri="{BB962C8B-B14F-4D97-AF65-F5344CB8AC3E}">
-        <p14:creationId xmlns:p14="http://schemas.microsoft.com/office/powerpoint/2010/main" val="264883934"/>
+        <p14:creationId xmlns:p14="http://schemas.microsoft.com/office/powerpoint/2010/main" val="1337549954"/>
       </p:ext>
     </p:extLst>
   </p:cSld>
@@ -5103,7 +5373,7 @@
           <p:cNvPr id="2" name="Title 1">
             <a:extLst>
               <a:ext uri="{FF2B5EF4-FFF2-40B4-BE49-F238E27FC236}">
-                <a16:creationId xmlns:a16="http://schemas.microsoft.com/office/drawing/2014/main" id="{BB7857C3-F601-4DCB-8CEE-9E7FA3B7605F}"/>
+                <a16:creationId xmlns:a16="http://schemas.microsoft.com/office/drawing/2014/main" id="{C742066A-B8C7-4774-8EA7-A8B060917680}"/>
               </a:ext>
             </a:extLst>
           </p:cNvPr>
@@ -5116,20 +5386,32 @@
         </p:nvSpPr>
         <p:spPr/>
         <p:txBody>
-          <a:bodyPr/>
+          <a:bodyPr>
+            <a:normAutofit/>
+          </a:bodyPr>
           <a:lstStyle/>
           <a:p>
-            <a:pPr algn="ctr"/>
-            <a:r>
-              <a:rPr lang="en-US" b="1" dirty="0">
+            <a:r>
+              <a:rPr lang="en-US" sz="4000" b="1" dirty="0">
                 <a:solidFill>
                   <a:schemeClr val="accent1">
                     <a:lumMod val="75000"/>
                   </a:schemeClr>
                 </a:solidFill>
               </a:rPr>
-              <a:t>USER REQUIREMENTS</a:t>
-            </a:r>
+              <a:t>USER </a:t>
+            </a:r>
+            <a:r>
+              <a:rPr lang="en-US" sz="4000" b="1" dirty="0" smtClean="0">
+                <a:solidFill>
+                  <a:schemeClr val="accent1">
+                    <a:lumMod val="75000"/>
+                  </a:schemeClr>
+                </a:solidFill>
+              </a:rPr>
+              <a:t>REQUIREMENTS – Application Requirements</a:t>
+            </a:r>
+            <a:endParaRPr lang="en-US" sz="4000" dirty="0"/>
           </a:p>
         </p:txBody>
       </p:sp>
@@ -5138,7 +5420,7 @@
           <p:cNvPr id="3" name="Content Placeholder 2">
             <a:extLst>
               <a:ext uri="{FF2B5EF4-FFF2-40B4-BE49-F238E27FC236}">
-                <a16:creationId xmlns:a16="http://schemas.microsoft.com/office/drawing/2014/main" id="{66506E3D-2AD4-495D-A6C3-399135F42EC1}"/>
+                <a16:creationId xmlns:a16="http://schemas.microsoft.com/office/drawing/2014/main" id="{AF0F60CC-403E-4AD4-A882-72752B9482E7}"/>
               </a:ext>
             </a:extLst>
           </p:cNvPr>
@@ -5151,9 +5433,7 @@
         </p:nvSpPr>
         <p:spPr/>
         <p:txBody>
-          <a:bodyPr>
-            <a:normAutofit lnSpcReduction="10000"/>
-          </a:bodyPr>
+          <a:bodyPr/>
           <a:lstStyle/>
           <a:p>
             <a:pPr>
@@ -5161,123 +5441,70 @@
               <a:buChar char="•"/>
             </a:pPr>
             <a:r>
+              <a:rPr lang="en-US" dirty="0" smtClean="0"/>
+              <a:t>Provide </a:t>
+            </a:r>
+            <a:r>
               <a:rPr lang="en-US" dirty="0"/>
-              <a:t>Expected Queries</a:t>
-            </a:r>
-          </a:p>
-          <a:p>
-            <a:pPr lvl="1">
+              <a:t>a usable GUI to make usage easier</a:t>
+            </a:r>
+          </a:p>
+          <a:p>
+            <a:pPr>
               <a:buFont typeface="Arial" panose="020B0604020202020204" pitchFamily="34" charset="0"/>
               <a:buChar char="•"/>
             </a:pPr>
             <a:r>
-              <a:rPr lang="en-US" sz="2000" dirty="0"/>
-              <a:t>List the names of the courses offered by a specific program.</a:t>
-            </a:r>
-          </a:p>
-          <a:p>
-            <a:pPr lvl="1">
+              <a:rPr lang="en-US" dirty="0"/>
+              <a:t>Provide faster querying and report generation.</a:t>
+            </a:r>
+          </a:p>
+          <a:p>
+            <a:pPr>
               <a:buFont typeface="Arial" panose="020B0604020202020204" pitchFamily="34" charset="0"/>
               <a:buChar char="•"/>
             </a:pPr>
             <a:r>
-              <a:rPr lang="en-US" sz="2000" dirty="0"/>
-              <a:t>List what courses are offered in a specific department during a specific semester.</a:t>
-            </a:r>
-          </a:p>
-          <a:p>
-            <a:pPr lvl="1">
+              <a:rPr lang="en-US" dirty="0"/>
+              <a:t>Provide meaningful, easy to view reports.</a:t>
+            </a:r>
+          </a:p>
+          <a:p>
+            <a:pPr>
               <a:buFont typeface="Arial" panose="020B0604020202020204" pitchFamily="34" charset="0"/>
               <a:buChar char="•"/>
             </a:pPr>
             <a:r>
-              <a:rPr lang="en-US" sz="2000" dirty="0"/>
-              <a:t>List the first and last names of staff that teach a course in a specific program.</a:t>
-            </a:r>
-          </a:p>
-          <a:p>
-            <a:pPr lvl="1">
+              <a:rPr lang="en-US" dirty="0"/>
+              <a:t>Allow the program to be expanded upon in the future based on the needs of the customer</a:t>
+            </a:r>
+          </a:p>
+          <a:p>
+            <a:pPr>
               <a:buFont typeface="Arial" panose="020B0604020202020204" pitchFamily="34" charset="0"/>
               <a:buChar char="•"/>
             </a:pPr>
             <a:r>
-              <a:rPr lang="en-US" sz="2000" dirty="0"/>
-              <a:t>List the first and last names of staff that are also an advisor.</a:t>
-            </a:r>
-          </a:p>
-          <a:p>
-            <a:pPr lvl="1">
+              <a:rPr lang="en-US" dirty="0"/>
+              <a:t>Allow the user to execute queries if needed</a:t>
+            </a:r>
+          </a:p>
+          <a:p>
+            <a:pPr>
               <a:buFont typeface="Arial" panose="020B0604020202020204" pitchFamily="34" charset="0"/>
               <a:buChar char="•"/>
             </a:pPr>
             <a:r>
-              <a:rPr lang="en-US" sz="2000" dirty="0"/>
-              <a:t>List the first and last names of students who has a specific staff member as an advisor.</a:t>
-            </a:r>
-          </a:p>
-          <a:p>
-            <a:pPr lvl="1">
-              <a:buFont typeface="Arial" panose="020B0604020202020204" pitchFamily="34" charset="0"/>
-              <a:buChar char="•"/>
-            </a:pPr>
-            <a:r>
-              <a:rPr lang="en-US" sz="2000" dirty="0"/>
-              <a:t>Retrieve how many students withdrew/dropped a specific course during a specific semester.</a:t>
-            </a:r>
-          </a:p>
-          <a:p>
-            <a:pPr lvl="1">
-              <a:buFont typeface="Arial" panose="020B0604020202020204" pitchFamily="34" charset="0"/>
-              <a:buChar char="•"/>
-            </a:pPr>
-            <a:r>
-              <a:rPr lang="en-US" sz="2000" dirty="0"/>
-              <a:t>Generate a list of professors who have taught at Baltimore City Community College for more than or equal to five years as of a specific semester.</a:t>
-            </a:r>
-          </a:p>
-          <a:p>
-            <a:pPr lvl="1">
-              <a:buFont typeface="Arial" panose="020B0604020202020204" pitchFamily="34" charset="0"/>
-              <a:buChar char="•"/>
-            </a:pPr>
-            <a:r>
-              <a:rPr lang="en-US" sz="2000" dirty="0"/>
-              <a:t>List all of the first and last names of students enrolled in a specific program who are female.</a:t>
-            </a:r>
-          </a:p>
-          <a:p>
-            <a:pPr lvl="1">
-              <a:buFont typeface="Arial" panose="020B0604020202020204" pitchFamily="34" charset="0"/>
-              <a:buChar char="•"/>
-            </a:pPr>
-            <a:r>
-              <a:rPr lang="en-US" sz="2000" dirty="0"/>
-              <a:t>Find the name of the student who has a specific ID no.</a:t>
-            </a:r>
-          </a:p>
-          <a:p>
-            <a:pPr lvl="1">
-              <a:buFont typeface="Arial" panose="020B0604020202020204" pitchFamily="34" charset="0"/>
-              <a:buChar char="•"/>
-            </a:pPr>
-            <a:r>
-              <a:rPr lang="en-US" sz="2000" dirty="0"/>
-              <a:t>List the grade records all of the courses during a specific semester for a particular student. </a:t>
-            </a:r>
-          </a:p>
-          <a:p>
-            <a:pPr lvl="1">
-              <a:buFont typeface="Arial" panose="020B0604020202020204" pitchFamily="34" charset="0"/>
-              <a:buChar char="•"/>
-            </a:pPr>
-            <a:endParaRPr lang="en-US" dirty="0"/>
+              <a:rPr lang="en-US" dirty="0"/>
+              <a:t>Allow user to perform all expected queries in a GUI environment</a:t>
+            </a:r>
           </a:p>
         </p:txBody>
       </p:sp>
     </p:spTree>
     <p:extLst>
       <p:ext uri="{BB962C8B-B14F-4D97-AF65-F5344CB8AC3E}">
-        <p14:creationId xmlns:p14="http://schemas.microsoft.com/office/powerpoint/2010/main" val="1337549954"/>
+        <p14:creationId xmlns:p14="http://schemas.microsoft.com/office/powerpoint/2010/main" val="3480385375"/>
       </p:ext>
     </p:extLst>
   </p:cSld>
@@ -5309,7 +5536,7 @@
           <p:cNvPr id="2" name="Title 1">
             <a:extLst>
               <a:ext uri="{FF2B5EF4-FFF2-40B4-BE49-F238E27FC236}">
-                <a16:creationId xmlns:a16="http://schemas.microsoft.com/office/drawing/2014/main" id="{C742066A-B8C7-4774-8EA7-A8B060917680}"/>
+                <a16:creationId xmlns:a16="http://schemas.microsoft.com/office/drawing/2014/main" id="{BB7857C3-F601-4DCB-8CEE-9E7FA3B7605F}"/>
               </a:ext>
             </a:extLst>
           </p:cNvPr>
@@ -5334,9 +5561,8 @@
                   </a:schemeClr>
                 </a:solidFill>
               </a:rPr>
-              <a:t>USER REQUIREMENTS</a:t>
-            </a:r>
-            <a:endParaRPr lang="en-US" dirty="0"/>
+              <a:t>DATA MODEL REQUIREMENTS</a:t>
+            </a:r>
           </a:p>
         </p:txBody>
       </p:sp>
@@ -5345,7 +5571,7 @@
           <p:cNvPr id="3" name="Content Placeholder 2">
             <a:extLst>
               <a:ext uri="{FF2B5EF4-FFF2-40B4-BE49-F238E27FC236}">
-                <a16:creationId xmlns:a16="http://schemas.microsoft.com/office/drawing/2014/main" id="{AF0F60CC-403E-4AD4-A882-72752B9482E7}"/>
+                <a16:creationId xmlns:a16="http://schemas.microsoft.com/office/drawing/2014/main" id="{66506E3D-2AD4-495D-A6C3-399135F42EC1}"/>
               </a:ext>
             </a:extLst>
           </p:cNvPr>
@@ -5358,26 +5584,18 @@
         </p:nvSpPr>
         <p:spPr/>
         <p:txBody>
-          <a:bodyPr/>
+          <a:bodyPr>
+            <a:normAutofit lnSpcReduction="10000"/>
+          </a:bodyPr>
           <a:lstStyle/>
-          <a:p>
-            <a:pPr>
-              <a:buFont typeface="Arial" panose="020B0604020202020204" pitchFamily="34" charset="0"/>
-              <a:buChar char="•"/>
-            </a:pPr>
-            <a:r>
-              <a:rPr lang="en-US" dirty="0"/>
-              <a:t>Application requirements</a:t>
-            </a:r>
-          </a:p>
           <a:p>
             <a:pPr lvl="1">
               <a:buFont typeface="Arial" panose="020B0604020202020204" pitchFamily="34" charset="0"/>
               <a:buChar char="•"/>
             </a:pPr>
             <a:r>
-              <a:rPr lang="en-US" dirty="0"/>
-              <a:t>Provide a usable GUI to make usage easier</a:t>
+              <a:rPr lang="en-US" sz="2000" dirty="0"/>
+              <a:t>Allow user to update all tables.</a:t>
             </a:r>
           </a:p>
           <a:p>
@@ -5386,8 +5604,8 @@
               <a:buChar char="•"/>
             </a:pPr>
             <a:r>
-              <a:rPr lang="en-US" dirty="0"/>
-              <a:t>Provide faster querying and report generation.</a:t>
+              <a:rPr lang="en-US" sz="2000" dirty="0"/>
+              <a:t>Allow user to access specific information for students, staff, courses, etc.</a:t>
             </a:r>
           </a:p>
           <a:p>
@@ -5396,8 +5614,8 @@
               <a:buChar char="•"/>
             </a:pPr>
             <a:r>
-              <a:rPr lang="en-US" dirty="0"/>
-              <a:t>Provide meaningful, easy to view reports.</a:t>
+              <a:rPr lang="en-US" sz="2000" dirty="0"/>
+              <a:t>Allow user to generate a list of the number of students currently assigned under a specific department.</a:t>
             </a:r>
           </a:p>
           <a:p>
@@ -5406,8 +5624,8 @@
               <a:buChar char="•"/>
             </a:pPr>
             <a:r>
-              <a:rPr lang="en-US" dirty="0"/>
-              <a:t>Allow the program to be expanded upon in the future based on the needs of the customer</a:t>
+              <a:rPr lang="en-US" sz="2000" dirty="0"/>
+              <a:t>Allow user to generate a list of staff assigned to a specific course.</a:t>
             </a:r>
           </a:p>
           <a:p>
@@ -5416,8 +5634,8 @@
               <a:buChar char="•"/>
             </a:pPr>
             <a:r>
-              <a:rPr lang="en-US" dirty="0"/>
-              <a:t>Allow the user to execute queries if needed</a:t>
+              <a:rPr lang="en-US" sz="2000" dirty="0"/>
+              <a:t>Allow user to generate a list of courses offered by a program during a specific semester.</a:t>
             </a:r>
           </a:p>
           <a:p>
@@ -5426,16 +5644,63 @@
               <a:buChar char="•"/>
             </a:pPr>
             <a:r>
-              <a:rPr lang="en-US" dirty="0"/>
-              <a:t>Allow user to perform all expected queries in a GUI environment</a:t>
-            </a:r>
+              <a:rPr lang="en-US" sz="2000" dirty="0"/>
+              <a:t>Allow user to retrieve grade records for a specific course.</a:t>
+            </a:r>
+          </a:p>
+          <a:p>
+            <a:pPr lvl="1">
+              <a:buFont typeface="Arial" panose="020B0604020202020204" pitchFamily="34" charset="0"/>
+              <a:buChar char="•"/>
+            </a:pPr>
+            <a:r>
+              <a:rPr lang="en-US" sz="2000" dirty="0"/>
+              <a:t>Allow user to retrieve grade records for each student.</a:t>
+            </a:r>
+          </a:p>
+          <a:p>
+            <a:pPr lvl="1">
+              <a:buFont typeface="Arial" panose="020B0604020202020204" pitchFamily="34" charset="0"/>
+              <a:buChar char="•"/>
+            </a:pPr>
+            <a:r>
+              <a:rPr lang="en-US" sz="2000" dirty="0"/>
+              <a:t>Allow user to retrieve a list of visitors on a specific day.</a:t>
+            </a:r>
+          </a:p>
+          <a:p>
+            <a:pPr lvl="1">
+              <a:buFont typeface="Arial" panose="020B0604020202020204" pitchFamily="34" charset="0"/>
+              <a:buChar char="•"/>
+            </a:pPr>
+            <a:r>
+              <a:rPr lang="en-US" sz="2000" dirty="0"/>
+              <a:t>Allow user to separate information according to identification status (student, staff, or visitor).</a:t>
+            </a:r>
+          </a:p>
+          <a:p>
+            <a:pPr lvl="1">
+              <a:buFont typeface="Arial" panose="020B0604020202020204" pitchFamily="34" charset="0"/>
+              <a:buChar char="•"/>
+            </a:pPr>
+            <a:r>
+              <a:rPr lang="en-US" sz="2000" dirty="0"/>
+              <a:t>Allow user to verify all students have an advisor.</a:t>
+            </a:r>
+          </a:p>
+          <a:p>
+            <a:pPr lvl="1">
+              <a:buFont typeface="Arial" panose="020B0604020202020204" pitchFamily="34" charset="0"/>
+              <a:buChar char="•"/>
+            </a:pPr>
+            <a:endParaRPr lang="en-US" dirty="0"/>
           </a:p>
         </p:txBody>
       </p:sp>
     </p:spTree>
     <p:extLst>
       <p:ext uri="{BB962C8B-B14F-4D97-AF65-F5344CB8AC3E}">
-        <p14:creationId xmlns:p14="http://schemas.microsoft.com/office/powerpoint/2010/main" val="3480385375"/>
+        <p14:creationId xmlns:p14="http://schemas.microsoft.com/office/powerpoint/2010/main" val="56412560"/>
       </p:ext>
     </p:extLst>
   </p:cSld>
@@ -5467,7 +5732,7 @@
           <p:cNvPr id="2" name="Title 1">
             <a:extLst>
               <a:ext uri="{FF2B5EF4-FFF2-40B4-BE49-F238E27FC236}">
-                <a16:creationId xmlns:a16="http://schemas.microsoft.com/office/drawing/2014/main" id="{BB7857C3-F601-4DCB-8CEE-9E7FA3B7605F}"/>
+                <a16:creationId xmlns:a16="http://schemas.microsoft.com/office/drawing/2014/main" id="{2DEB12E0-5752-42F8-BF8A-4975ECC51C8A}"/>
               </a:ext>
             </a:extLst>
           </p:cNvPr>
@@ -5478,9 +5743,16 @@
             <p:ph type="title"/>
           </p:nvPr>
         </p:nvSpPr>
-        <p:spPr/>
-        <p:txBody>
-          <a:bodyPr/>
+        <p:spPr>
+          <a:xfrm>
+            <a:off x="1066799" y="590550"/>
+            <a:ext cx="10058400" cy="1861185"/>
+          </a:xfrm>
+        </p:spPr>
+        <p:txBody>
+          <a:bodyPr>
+            <a:normAutofit/>
+          </a:bodyPr>
           <a:lstStyle/>
           <a:p>
             <a:pPr algn="ctr"/>
@@ -5492,201 +5764,18 @@
                   </a:schemeClr>
                 </a:solidFill>
               </a:rPr>
-              <a:t>DATA MODEL REQUIREMENTS</a:t>
-            </a:r>
-          </a:p>
-        </p:txBody>
-      </p:sp>
-      <p:sp>
-        <p:nvSpPr>
-          <p:cNvPr id="3" name="Content Placeholder 2">
-            <a:extLst>
-              <a:ext uri="{FF2B5EF4-FFF2-40B4-BE49-F238E27FC236}">
-                <a16:creationId xmlns:a16="http://schemas.microsoft.com/office/drawing/2014/main" id="{66506E3D-2AD4-495D-A6C3-399135F42EC1}"/>
-              </a:ext>
-            </a:extLst>
-          </p:cNvPr>
-          <p:cNvSpPr>
-            <a:spLocks noGrp="1"/>
-          </p:cNvSpPr>
-          <p:nvPr>
-            <p:ph idx="1"/>
-          </p:nvPr>
-        </p:nvSpPr>
-        <p:spPr/>
-        <p:txBody>
-          <a:bodyPr>
-            <a:normAutofit lnSpcReduction="10000"/>
-          </a:bodyPr>
-          <a:lstStyle/>
-          <a:p>
-            <a:pPr lvl="1">
-              <a:buFont typeface="Arial" panose="020B0604020202020204" pitchFamily="34" charset="0"/>
-              <a:buChar char="•"/>
-            </a:pPr>
-            <a:r>
-              <a:rPr lang="en-US" sz="2000" dirty="0"/>
-              <a:t>Allow user to update all tables.</a:t>
-            </a:r>
-          </a:p>
-          <a:p>
-            <a:pPr lvl="1">
-              <a:buFont typeface="Arial" panose="020B0604020202020204" pitchFamily="34" charset="0"/>
-              <a:buChar char="•"/>
-            </a:pPr>
-            <a:r>
-              <a:rPr lang="en-US" sz="2000" dirty="0"/>
-              <a:t>Allow user to access specific information for students, staff, courses, etc.</a:t>
-            </a:r>
-          </a:p>
-          <a:p>
-            <a:pPr lvl="1">
-              <a:buFont typeface="Arial" panose="020B0604020202020204" pitchFamily="34" charset="0"/>
-              <a:buChar char="•"/>
-            </a:pPr>
-            <a:r>
-              <a:rPr lang="en-US" sz="2000" dirty="0"/>
-              <a:t>Allow user to generate a list of the number of students currently assigned under a specific department.</a:t>
-            </a:r>
-          </a:p>
-          <a:p>
-            <a:pPr lvl="1">
-              <a:buFont typeface="Arial" panose="020B0604020202020204" pitchFamily="34" charset="0"/>
-              <a:buChar char="•"/>
-            </a:pPr>
-            <a:r>
-              <a:rPr lang="en-US" sz="2000" dirty="0"/>
-              <a:t>Allow user to generate a list of staff assigned to a specific course.</a:t>
-            </a:r>
-          </a:p>
-          <a:p>
-            <a:pPr lvl="1">
-              <a:buFont typeface="Arial" panose="020B0604020202020204" pitchFamily="34" charset="0"/>
-              <a:buChar char="•"/>
-            </a:pPr>
-            <a:r>
-              <a:rPr lang="en-US" sz="2000" dirty="0"/>
-              <a:t>Allow user to generate a list of courses offered by a program during a specific semester.</a:t>
-            </a:r>
-          </a:p>
-          <a:p>
-            <a:pPr lvl="1">
-              <a:buFont typeface="Arial" panose="020B0604020202020204" pitchFamily="34" charset="0"/>
-              <a:buChar char="•"/>
-            </a:pPr>
-            <a:r>
-              <a:rPr lang="en-US" sz="2000" dirty="0"/>
-              <a:t>Allow user to retrieve grade records for a specific course.</a:t>
-            </a:r>
-          </a:p>
-          <a:p>
-            <a:pPr lvl="1">
-              <a:buFont typeface="Arial" panose="020B0604020202020204" pitchFamily="34" charset="0"/>
-              <a:buChar char="•"/>
-            </a:pPr>
-            <a:r>
-              <a:rPr lang="en-US" sz="2000" dirty="0"/>
-              <a:t>Allow user to retrieve grade records for each student.</a:t>
-            </a:r>
-          </a:p>
-          <a:p>
-            <a:pPr lvl="1">
-              <a:buFont typeface="Arial" panose="020B0604020202020204" pitchFamily="34" charset="0"/>
-              <a:buChar char="•"/>
-            </a:pPr>
-            <a:r>
-              <a:rPr lang="en-US" sz="2000" dirty="0"/>
-              <a:t>Allow user to retrieve a list of visitors on a specific day.</a:t>
-            </a:r>
-          </a:p>
-          <a:p>
-            <a:pPr lvl="1">
-              <a:buFont typeface="Arial" panose="020B0604020202020204" pitchFamily="34" charset="0"/>
-              <a:buChar char="•"/>
-            </a:pPr>
-            <a:r>
-              <a:rPr lang="en-US" sz="2000" dirty="0"/>
-              <a:t>Allow user to separate information according to identification status (student, staff, or visitor).</a:t>
-            </a:r>
-          </a:p>
-          <a:p>
-            <a:pPr lvl="1">
-              <a:buFont typeface="Arial" panose="020B0604020202020204" pitchFamily="34" charset="0"/>
-              <a:buChar char="•"/>
-            </a:pPr>
-            <a:r>
-              <a:rPr lang="en-US" sz="2000" dirty="0"/>
-              <a:t>Allow user to verify all students have an advisor.</a:t>
-            </a:r>
-          </a:p>
-          <a:p>
-            <a:pPr lvl="1">
-              <a:buFont typeface="Arial" panose="020B0604020202020204" pitchFamily="34" charset="0"/>
-              <a:buChar char="•"/>
-            </a:pPr>
-            <a:endParaRPr lang="en-US" dirty="0"/>
-          </a:p>
-        </p:txBody>
-      </p:sp>
-    </p:spTree>
-    <p:extLst>
-      <p:ext uri="{BB962C8B-B14F-4D97-AF65-F5344CB8AC3E}">
-        <p14:creationId xmlns:p14="http://schemas.microsoft.com/office/powerpoint/2010/main" val="56412560"/>
-      </p:ext>
-    </p:extLst>
-  </p:cSld>
-  <p:clrMapOvr>
-    <a:masterClrMapping/>
-  </p:clrMapOvr>
-</p:sld>
-</file>
-
-<file path=ppt/slides/slide7.xml><?xml version="1.0" encoding="utf-8"?>
-<p:sld xmlns:a="http://schemas.openxmlformats.org/drawingml/2006/main" xmlns:r="http://schemas.openxmlformats.org/officeDocument/2006/relationships" xmlns:p="http://schemas.openxmlformats.org/presentationml/2006/main">
-  <p:cSld>
-    <p:spTree>
-      <p:nvGrpSpPr>
-        <p:cNvPr id="1" name=""/>
-        <p:cNvGrpSpPr/>
-        <p:nvPr/>
-      </p:nvGrpSpPr>
-      <p:grpSpPr>
-        <a:xfrm>
-          <a:off x="0" y="0"/>
-          <a:ext cx="0" cy="0"/>
-          <a:chOff x="0" y="0"/>
-          <a:chExt cx="0" cy="0"/>
-        </a:xfrm>
-      </p:grpSpPr>
-      <p:sp>
-        <p:nvSpPr>
-          <p:cNvPr id="2" name="Title 1">
-            <a:extLst>
-              <a:ext uri="{FF2B5EF4-FFF2-40B4-BE49-F238E27FC236}">
-                <a16:creationId xmlns:a16="http://schemas.microsoft.com/office/drawing/2014/main" id="{2DEB12E0-5752-42F8-BF8A-4975ECC51C8A}"/>
-              </a:ext>
-            </a:extLst>
-          </p:cNvPr>
-          <p:cNvSpPr>
-            <a:spLocks noGrp="1"/>
-          </p:cNvSpPr>
-          <p:nvPr>
-            <p:ph type="title"/>
-          </p:nvPr>
-        </p:nvSpPr>
-        <p:spPr>
-          <a:xfrm>
-            <a:off x="1066799" y="590550"/>
-            <a:ext cx="10058400" cy="1861185"/>
-          </a:xfrm>
-        </p:spPr>
-        <p:txBody>
-          <a:bodyPr>
-            <a:normAutofit/>
-          </a:bodyPr>
-          <a:lstStyle/>
-          <a:p>
-            <a:pPr algn="ctr"/>
+              <a:t>DATA MODEL </a:t>
+            </a:r>
+            <a:r>
+              <a:rPr lang="en-US" b="1" dirty="0" smtClean="0">
+                <a:solidFill>
+                  <a:schemeClr val="accent1">
+                    <a:lumMod val="75000"/>
+                  </a:schemeClr>
+                </a:solidFill>
+              </a:rPr>
+              <a:t>– </a:t>
+            </a:r>
             <a:r>
               <a:rPr lang="en-US" b="1" dirty="0">
                 <a:solidFill>
@@ -5695,7 +5784,7 @@
                   </a:schemeClr>
                 </a:solidFill>
               </a:rPr>
-              <a:t>DATA MODEL / ERD</a:t>
+              <a:t>ERD</a:t>
             </a:r>
             <a:br>
               <a:rPr lang="en-US" b="1" dirty="0">
@@ -5713,31 +5802,6 @@
                 </a:schemeClr>
               </a:solidFill>
             </a:endParaRPr>
-          </a:p>
-        </p:txBody>
-      </p:sp>
-      <p:sp>
-        <p:nvSpPr>
-          <p:cNvPr id="3" name="Content Placeholder 2">
-            <a:extLst>
-              <a:ext uri="{FF2B5EF4-FFF2-40B4-BE49-F238E27FC236}">
-                <a16:creationId xmlns:a16="http://schemas.microsoft.com/office/drawing/2014/main" id="{518BDB10-9F60-493D-BA60-CC817E353404}"/>
-              </a:ext>
-            </a:extLst>
-          </p:cNvPr>
-          <p:cNvSpPr>
-            <a:spLocks noGrp="1"/>
-          </p:cNvSpPr>
-          <p:nvPr>
-            <p:ph idx="1"/>
-          </p:nvPr>
-        </p:nvSpPr>
-        <p:spPr/>
-        <p:txBody>
-          <a:bodyPr/>
-          <a:lstStyle/>
-          <a:p>
-            <a:endParaRPr lang="en-US" dirty="0"/>
           </a:p>
         </p:txBody>
       </p:sp>
@@ -5784,7 +5848,7 @@
 </p:sld>
 </file>
 
-<file path=ppt/slides/slide8.xml><?xml version="1.0" encoding="utf-8"?>
+<file path=ppt/slides/slide7.xml><?xml version="1.0" encoding="utf-8"?>
 <p:sld xmlns:a="http://schemas.openxmlformats.org/drawingml/2006/main" xmlns:r="http://schemas.openxmlformats.org/officeDocument/2006/relationships" xmlns:p="http://schemas.openxmlformats.org/presentationml/2006/main">
   <p:cSld>
     <p:spTree>
@@ -5831,8 +5895,25 @@
                   </a:schemeClr>
                 </a:solidFill>
               </a:rPr>
-              <a:t>DATA MODEL / SCHEMA</a:t>
-            </a:r>
+              <a:t>DATA MODEL </a:t>
+            </a:r>
+            <a:r>
+              <a:rPr lang="en-US" b="1" dirty="0" smtClean="0">
+                <a:solidFill>
+                  <a:schemeClr val="accent1">
+                    <a:lumMod val="75000"/>
+                  </a:schemeClr>
+                </a:solidFill>
+              </a:rPr>
+              <a:t>– SCHEMA</a:t>
+            </a:r>
+            <a:endParaRPr lang="en-US" b="1" dirty="0">
+              <a:solidFill>
+                <a:schemeClr val="accent1">
+                  <a:lumMod val="75000"/>
+                </a:schemeClr>
+              </a:solidFill>
+            </a:endParaRPr>
           </a:p>
         </p:txBody>
       </p:sp>
@@ -5881,6 +5962,167 @@
 </p:sld>
 </file>
 
+<file path=ppt/slides/slide8.xml><?xml version="1.0" encoding="utf-8"?>
+<p:sld xmlns:a="http://schemas.openxmlformats.org/drawingml/2006/main" xmlns:r="http://schemas.openxmlformats.org/officeDocument/2006/relationships" xmlns:p="http://schemas.openxmlformats.org/presentationml/2006/main">
+  <p:cSld>
+    <p:spTree>
+      <p:nvGrpSpPr>
+        <p:cNvPr id="1" name=""/>
+        <p:cNvGrpSpPr/>
+        <p:nvPr/>
+      </p:nvGrpSpPr>
+      <p:grpSpPr>
+        <a:xfrm>
+          <a:off x="0" y="0"/>
+          <a:ext cx="0" cy="0"/>
+          <a:chOff x="0" y="0"/>
+          <a:chExt cx="0" cy="0"/>
+        </a:xfrm>
+      </p:grpSpPr>
+      <p:sp>
+        <p:nvSpPr>
+          <p:cNvPr id="2" name="Title 1">
+            <a:extLst>
+              <a:ext uri="{FF2B5EF4-FFF2-40B4-BE49-F238E27FC236}">
+                <a16:creationId xmlns:a16="http://schemas.microsoft.com/office/drawing/2014/main" id="{BB7857C3-F601-4DCB-8CEE-9E7FA3B7605F}"/>
+              </a:ext>
+            </a:extLst>
+          </p:cNvPr>
+          <p:cNvSpPr>
+            <a:spLocks noGrp="1"/>
+          </p:cNvSpPr>
+          <p:nvPr>
+            <p:ph type="title"/>
+          </p:nvPr>
+        </p:nvSpPr>
+        <p:spPr/>
+        <p:txBody>
+          <a:bodyPr/>
+          <a:lstStyle/>
+          <a:p>
+            <a:pPr algn="ctr"/>
+            <a:r>
+              <a:rPr lang="en-US" b="1" dirty="0">
+                <a:solidFill>
+                  <a:schemeClr val="accent1">
+                    <a:lumMod val="75000"/>
+                  </a:schemeClr>
+                </a:solidFill>
+              </a:rPr>
+              <a:t>APPLICATION</a:t>
+            </a:r>
+          </a:p>
+        </p:txBody>
+      </p:sp>
+      <p:sp>
+        <p:nvSpPr>
+          <p:cNvPr id="3" name="Content Placeholder 2">
+            <a:extLst>
+              <a:ext uri="{FF2B5EF4-FFF2-40B4-BE49-F238E27FC236}">
+                <a16:creationId xmlns:a16="http://schemas.microsoft.com/office/drawing/2014/main" id="{66506E3D-2AD4-495D-A6C3-399135F42EC1}"/>
+              </a:ext>
+            </a:extLst>
+          </p:cNvPr>
+          <p:cNvSpPr>
+            <a:spLocks noGrp="1"/>
+          </p:cNvSpPr>
+          <p:nvPr>
+            <p:ph idx="1"/>
+          </p:nvPr>
+        </p:nvSpPr>
+        <p:spPr/>
+        <p:txBody>
+          <a:bodyPr/>
+          <a:lstStyle/>
+          <a:p>
+            <a:pPr>
+              <a:buFont typeface="Arial" panose="020B0604020202020204" pitchFamily="34" charset="0"/>
+              <a:buChar char="•"/>
+            </a:pPr>
+            <a:r>
+              <a:rPr lang="en-US" dirty="0"/>
+              <a:t>Application is written in Python 3 and utilizes the built-in </a:t>
+            </a:r>
+            <a:r>
+              <a:rPr lang="en-US" dirty="0" err="1" smtClean="0"/>
+              <a:t>Tkinter</a:t>
+            </a:r>
+            <a:r>
+              <a:rPr lang="en-US" dirty="0" smtClean="0"/>
+              <a:t> GUI library </a:t>
+            </a:r>
+            <a:r>
+              <a:rPr lang="en-US" dirty="0"/>
+              <a:t>to </a:t>
+            </a:r>
+            <a:r>
+              <a:rPr lang="en-US" dirty="0" smtClean="0"/>
+              <a:t>create windows and place elements within them</a:t>
+            </a:r>
+            <a:endParaRPr lang="en-US" dirty="0"/>
+          </a:p>
+          <a:p>
+            <a:pPr>
+              <a:buFont typeface="Arial" panose="020B0604020202020204" pitchFamily="34" charset="0"/>
+              <a:buChar char="•"/>
+            </a:pPr>
+            <a:r>
+              <a:rPr lang="en-US" dirty="0"/>
+              <a:t>One external library is required to connect to the </a:t>
+            </a:r>
+            <a:r>
+              <a:rPr lang="en-US" dirty="0" smtClean="0"/>
+              <a:t>database: </a:t>
+            </a:r>
+            <a:r>
+              <a:rPr lang="en-US" dirty="0" err="1"/>
+              <a:t>mysql.connector</a:t>
+            </a:r>
+            <a:endParaRPr lang="en-US" dirty="0"/>
+          </a:p>
+          <a:p>
+            <a:pPr>
+              <a:buFont typeface="Arial" panose="020B0604020202020204" pitchFamily="34" charset="0"/>
+              <a:buChar char="•"/>
+            </a:pPr>
+            <a:r>
+              <a:rPr lang="en-US" dirty="0" smtClean="0"/>
+              <a:t>No authentication necessary for ease-of-use; hardcoded username and password for connection</a:t>
+            </a:r>
+          </a:p>
+          <a:p>
+            <a:pPr lvl="1">
+              <a:buFont typeface="Arial" panose="020B0604020202020204" pitchFamily="34" charset="0"/>
+              <a:buChar char="•"/>
+            </a:pPr>
+            <a:r>
+              <a:rPr lang="en-US" dirty="0" smtClean="0"/>
+              <a:t>Can easily change this by opening a window at the start asking the user for this information</a:t>
+            </a:r>
+            <a:endParaRPr lang="en-US" dirty="0"/>
+          </a:p>
+          <a:p>
+            <a:pPr>
+              <a:buFont typeface="Arial" panose="020B0604020202020204" pitchFamily="34" charset="0"/>
+              <a:buChar char="•"/>
+            </a:pPr>
+            <a:endParaRPr lang="en-US" dirty="0"/>
+          </a:p>
+        </p:txBody>
+      </p:sp>
+    </p:spTree>
+    <p:extLst>
+      <p:ext uri="{BB962C8B-B14F-4D97-AF65-F5344CB8AC3E}">
+        <p14:creationId xmlns:p14="http://schemas.microsoft.com/office/powerpoint/2010/main" val="2780302791"/>
+      </p:ext>
+    </p:extLst>
+  </p:cSld>
+  <p:clrMapOvr>
+    <a:masterClrMapping/>
+  </p:clrMapOvr>
+</p:sld>
+</file>
+
 <file path=ppt/slides/slide9.xml><?xml version="1.0" encoding="utf-8"?>
 <p:sld xmlns:a="http://schemas.openxmlformats.org/drawingml/2006/main" xmlns:r="http://schemas.openxmlformats.org/officeDocument/2006/relationships" xmlns:p="http://schemas.openxmlformats.org/presentationml/2006/main">
   <p:cSld>
@@ -5930,78 +6172,6 @@
               </a:rPr>
               <a:t>APPLICATION</a:t>
             </a:r>
-          </a:p>
-        </p:txBody>
-      </p:sp>
-      <p:sp>
-        <p:nvSpPr>
-          <p:cNvPr id="3" name="Content Placeholder 2">
-            <a:extLst>
-              <a:ext uri="{FF2B5EF4-FFF2-40B4-BE49-F238E27FC236}">
-                <a16:creationId xmlns:a16="http://schemas.microsoft.com/office/drawing/2014/main" id="{66506E3D-2AD4-495D-A6C3-399135F42EC1}"/>
-              </a:ext>
-            </a:extLst>
-          </p:cNvPr>
-          <p:cNvSpPr>
-            <a:spLocks noGrp="1"/>
-          </p:cNvSpPr>
-          <p:nvPr>
-            <p:ph idx="1"/>
-          </p:nvPr>
-        </p:nvSpPr>
-        <p:spPr/>
-        <p:txBody>
-          <a:bodyPr/>
-          <a:lstStyle/>
-          <a:p>
-            <a:pPr>
-              <a:buFont typeface="Arial" panose="020B0604020202020204" pitchFamily="34" charset="0"/>
-              <a:buChar char="•"/>
-            </a:pPr>
-            <a:r>
-              <a:rPr lang="en-US" dirty="0"/>
-              <a:t>Application is written in Python 3 and utilizes the built-in library </a:t>
-            </a:r>
-            <a:r>
-              <a:rPr lang="en-US" dirty="0" err="1"/>
-              <a:t>Tkinter</a:t>
-            </a:r>
-            <a:r>
-              <a:rPr lang="en-US" dirty="0"/>
-              <a:t> to create GUI windows</a:t>
-            </a:r>
-          </a:p>
-          <a:p>
-            <a:pPr>
-              <a:buFont typeface="Arial" panose="020B0604020202020204" pitchFamily="34" charset="0"/>
-              <a:buChar char="•"/>
-            </a:pPr>
-            <a:r>
-              <a:rPr lang="en-US" dirty="0"/>
-              <a:t>One external library is required to connect to the database, </a:t>
-            </a:r>
-            <a:r>
-              <a:rPr lang="en-US" dirty="0" err="1"/>
-              <a:t>mysql.connector</a:t>
-            </a:r>
-            <a:endParaRPr lang="en-US" dirty="0"/>
-          </a:p>
-          <a:p>
-            <a:pPr>
-              <a:buFont typeface="Arial" panose="020B0604020202020204" pitchFamily="34" charset="0"/>
-              <a:buChar char="•"/>
-            </a:pPr>
-            <a:r>
-              <a:rPr lang="en-US" dirty="0"/>
-              <a:t>Application currently doesn’t have a user login implemented yet, this will be implemented in future releases</a:t>
-            </a:r>
-          </a:p>
-          <a:p>
-            <a:pPr>
-              <a:buFont typeface="Arial" panose="020B0604020202020204" pitchFamily="34" charset="0"/>
-              <a:buChar char="•"/>
-            </a:pPr>
-            <a:endParaRPr lang="en-US" dirty="0"/>
           </a:p>
         </p:txBody>
       </p:sp>
@@ -6027,18 +6197,28 @@
         </p:blipFill>
         <p:spPr>
           <a:xfrm>
-            <a:off x="2504644" y="3429001"/>
-            <a:ext cx="6958444" cy="2766610"/>
+            <a:off x="1129785" y="2077004"/>
+            <a:ext cx="9993389" cy="3973275"/>
           </a:xfrm>
           <a:prstGeom prst="rect">
             <a:avLst/>
           </a:prstGeom>
+          <a:ln>
+            <a:noFill/>
+          </a:ln>
+          <a:effectLst>
+            <a:outerShdw blurRad="190500" algn="tl" rotWithShape="0">
+              <a:srgbClr val="000000">
+                <a:alpha val="70000"/>
+              </a:srgbClr>
+            </a:outerShdw>
+          </a:effectLst>
         </p:spPr>
       </p:pic>
     </p:spTree>
     <p:extLst>
       <p:ext uri="{BB962C8B-B14F-4D97-AF65-F5344CB8AC3E}">
-        <p14:creationId xmlns:p14="http://schemas.microsoft.com/office/powerpoint/2010/main" val="2780302791"/>
+        <p14:creationId xmlns:p14="http://schemas.microsoft.com/office/powerpoint/2010/main" val="428722454"/>
       </p:ext>
     </p:extLst>
   </p:cSld>

</xml_diff>